<commit_message>
Emma & Trinity--Name changes
</commit_message>
<xml_diff>
--- a/Kaggle Consumer Credit.pptx
+++ b/Kaggle Consumer Credit.pptx
@@ -114,7 +114,7 @@
   </p:defaultTextStyle>
   <p:extLst>
     <p:ext uri="{EFAFB233-063F-42B5-8137-9DF3F51BA10A}">
-      <p15:sldGuideLst xmlns:p15="http://schemas.microsoft.com/office/powerpoint/2012/main"/>
+      <p15:sldGuideLst xmlns:p15="http://schemas.microsoft.com/office/powerpoint/2012/main" xmlns=""/>
     </p:ext>
   </p:extLst>
 </p:presentation>
@@ -251,7 +251,7 @@
           <a:p>
             <a:fld id="{C771ECA8-CF27-4941-8D0D-1112D38F0F5D}" type="datetimeFigureOut">
               <a:rPr lang="en-US" smtClean="0"/>
-              <a:t>09/05/2016 - Monday</a:t>
+              <a:t>9/14/16</a:t>
             </a:fld>
             <a:endParaRPr lang="en-US"/>
           </a:p>
@@ -421,7 +421,7 @@
           <a:p>
             <a:fld id="{C771ECA8-CF27-4941-8D0D-1112D38F0F5D}" type="datetimeFigureOut">
               <a:rPr lang="en-US" smtClean="0"/>
-              <a:t>09/05/2016 - Monday</a:t>
+              <a:t>9/14/16</a:t>
             </a:fld>
             <a:endParaRPr lang="en-US"/>
           </a:p>
@@ -601,7 +601,7 @@
           <a:p>
             <a:fld id="{C771ECA8-CF27-4941-8D0D-1112D38F0F5D}" type="datetimeFigureOut">
               <a:rPr lang="en-US" smtClean="0"/>
-              <a:t>09/05/2016 - Monday</a:t>
+              <a:t>9/14/16</a:t>
             </a:fld>
             <a:endParaRPr lang="en-US"/>
           </a:p>
@@ -771,7 +771,7 @@
           <a:p>
             <a:fld id="{C771ECA8-CF27-4941-8D0D-1112D38F0F5D}" type="datetimeFigureOut">
               <a:rPr lang="en-US" smtClean="0"/>
-              <a:t>09/05/2016 - Monday</a:t>
+              <a:t>9/14/16</a:t>
             </a:fld>
             <a:endParaRPr lang="en-US"/>
           </a:p>
@@ -1017,7 +1017,7 @@
           <a:p>
             <a:fld id="{C771ECA8-CF27-4941-8D0D-1112D38F0F5D}" type="datetimeFigureOut">
               <a:rPr lang="en-US" smtClean="0"/>
-              <a:t>09/05/2016 - Monday</a:t>
+              <a:t>9/14/16</a:t>
             </a:fld>
             <a:endParaRPr lang="en-US"/>
           </a:p>
@@ -1249,7 +1249,7 @@
           <a:p>
             <a:fld id="{C771ECA8-CF27-4941-8D0D-1112D38F0F5D}" type="datetimeFigureOut">
               <a:rPr lang="en-US" smtClean="0"/>
-              <a:t>09/05/2016 - Monday</a:t>
+              <a:t>9/14/16</a:t>
             </a:fld>
             <a:endParaRPr lang="en-US"/>
           </a:p>
@@ -1616,7 +1616,7 @@
           <a:p>
             <a:fld id="{C771ECA8-CF27-4941-8D0D-1112D38F0F5D}" type="datetimeFigureOut">
               <a:rPr lang="en-US" smtClean="0"/>
-              <a:t>09/05/2016 - Monday</a:t>
+              <a:t>9/14/16</a:t>
             </a:fld>
             <a:endParaRPr lang="en-US"/>
           </a:p>
@@ -1734,7 +1734,7 @@
           <a:p>
             <a:fld id="{C771ECA8-CF27-4941-8D0D-1112D38F0F5D}" type="datetimeFigureOut">
               <a:rPr lang="en-US" smtClean="0"/>
-              <a:t>09/05/2016 - Monday</a:t>
+              <a:t>9/14/16</a:t>
             </a:fld>
             <a:endParaRPr lang="en-US"/>
           </a:p>
@@ -1829,7 +1829,7 @@
           <a:p>
             <a:fld id="{C771ECA8-CF27-4941-8D0D-1112D38F0F5D}" type="datetimeFigureOut">
               <a:rPr lang="en-US" smtClean="0"/>
-              <a:t>09/05/2016 - Monday</a:t>
+              <a:t>9/14/16</a:t>
             </a:fld>
             <a:endParaRPr lang="en-US"/>
           </a:p>
@@ -2106,7 +2106,7 @@
           <a:p>
             <a:fld id="{C771ECA8-CF27-4941-8D0D-1112D38F0F5D}" type="datetimeFigureOut">
               <a:rPr lang="en-US" smtClean="0"/>
-              <a:t>09/05/2016 - Monday</a:t>
+              <a:t>9/14/16</a:t>
             </a:fld>
             <a:endParaRPr lang="en-US"/>
           </a:p>
@@ -2359,7 +2359,7 @@
           <a:p>
             <a:fld id="{C771ECA8-CF27-4941-8D0D-1112D38F0F5D}" type="datetimeFigureOut">
               <a:rPr lang="en-US" smtClean="0"/>
-              <a:t>09/05/2016 - Monday</a:t>
+              <a:t>9/14/16</a:t>
             </a:fld>
             <a:endParaRPr lang="en-US"/>
           </a:p>
@@ -2600,7 +2600,7 @@
           <a:p>
             <a:fld id="{C771ECA8-CF27-4941-8D0D-1112D38F0F5D}" type="datetimeFigureOut">
               <a:rPr lang="en-US" smtClean="0"/>
-              <a:t>09/05/2016 - Monday</a:t>
+              <a:t>9/14/16</a:t>
             </a:fld>
             <a:endParaRPr lang="en-US"/>
           </a:p>
@@ -3045,12 +3045,6 @@
               </a:rPr>
               <a:t>Predicting Consumer</a:t>
             </a:r>
-            <a:r>
-              <a:rPr lang="en-US" b="1" dirty="0" smtClean="0">
-                <a:latin typeface="Calibri" panose="020F0502020204030204" pitchFamily="34" charset="0"/>
-              </a:rPr>
-              <a:t/>
-            </a:r>
             <a:br>
               <a:rPr lang="en-US" b="1" dirty="0" smtClean="0">
                 <a:latin typeface="Calibri" panose="020F0502020204030204" pitchFamily="34" charset="0"/>
@@ -3099,9 +3093,6 @@
               </a:rPr>
               <a:t>Team Eigenauts</a:t>
             </a:r>
-            <a:endParaRPr lang="en-US" b="1" dirty="0" smtClean="0">
-              <a:latin typeface="Calibri" panose="020F0502020204030204" pitchFamily="34" charset="0"/>
-            </a:endParaRPr>
           </a:p>
           <a:p>
             <a:r>
@@ -3116,7 +3107,25 @@
               <a:rPr lang="en-US" dirty="0" smtClean="0">
                 <a:latin typeface="Calibri" panose="020F0502020204030204" pitchFamily="34" charset="0"/>
               </a:rPr>
-              <a:t>Emma Zhu</a:t>
+              <a:t>Emma</a:t>
+            </a:r>
+            <a:r>
+              <a:rPr lang="en-US" dirty="0" smtClean="0">
+                <a:latin typeface="Calibri" panose="020F0502020204030204" pitchFamily="34" charset="0"/>
+              </a:rPr>
+              <a:t> (Jielei)</a:t>
+            </a:r>
+            <a:r>
+              <a:rPr lang="en-US" dirty="0" smtClean="0">
+                <a:latin typeface="Calibri" panose="020F0502020204030204" pitchFamily="34" charset="0"/>
+              </a:rPr>
+              <a:t> </a:t>
+            </a:r>
+            <a:r>
+              <a:rPr lang="en-US" dirty="0" smtClean="0">
+                <a:latin typeface="Calibri" panose="020F0502020204030204" pitchFamily="34" charset="0"/>
+              </a:rPr>
+              <a:t>Zhu</a:t>
             </a:r>
           </a:p>
           <a:p>
@@ -3144,10 +3153,10 @@
               <a:t>Trinity </a:t>
             </a:r>
             <a:r>
-              <a:rPr lang="en-US" dirty="0" err="1" smtClean="0">
+              <a:rPr lang="en-US" dirty="0" smtClean="0">
                 <a:latin typeface="Calibri" panose="020F0502020204030204" pitchFamily="34" charset="0"/>
               </a:rPr>
-              <a:t>Zhi</a:t>
+              <a:t>Yu</a:t>
             </a:r>
             <a:endParaRPr lang="en-US" dirty="0" smtClean="0">
               <a:latin typeface="Calibri" panose="020F0502020204030204" pitchFamily="34" charset="0"/>
@@ -3173,7 +3182,7 @@
   <p:timing>
     <p:tnLst>
       <p:par>
-        <p:cTn id="1" dur="indefinite" restart="never" nodeType="tmRoot"/>
+        <p:cTn xmlns:p14="http://schemas.microsoft.com/office/powerpoint/2010/main" id="1" dur="indefinite" restart="never" nodeType="tmRoot"/>
       </p:par>
     </p:tnLst>
   </p:timing>
@@ -3295,7 +3304,7 @@
   <p:timing>
     <p:tnLst>
       <p:par>
-        <p:cTn id="1" dur="indefinite" restart="never" nodeType="tmRoot"/>
+        <p:cTn xmlns:p14="http://schemas.microsoft.com/office/powerpoint/2010/main" id="1" dur="indefinite" restart="never" nodeType="tmRoot"/>
       </p:par>
     </p:tnLst>
   </p:timing>
@@ -3388,7 +3397,7 @@
   <p:timing>
     <p:tnLst>
       <p:par>
-        <p:cTn id="1" dur="indefinite" restart="never" nodeType="tmRoot"/>
+        <p:cTn xmlns:p14="http://schemas.microsoft.com/office/powerpoint/2010/main" id="1" dur="indefinite" restart="never" nodeType="tmRoot"/>
       </p:par>
     </p:tnLst>
   </p:timing>
@@ -3476,11 +3485,7 @@
           <a:p>
             <a:r>
               <a:rPr lang="en-US" dirty="0" smtClean="0"/>
-              <a:t>Models, Ensembles, and </a:t>
-            </a:r>
-            <a:r>
-              <a:rPr lang="en-US" dirty="0" smtClean="0"/>
-              <a:t>Hyper-Ensembles</a:t>
+              <a:t>Models, Ensembles, and Hyper-Ensembles</a:t>
             </a:r>
           </a:p>
           <a:p>
@@ -3509,7 +3514,7 @@
   <p:timing>
     <p:tnLst>
       <p:par>
-        <p:cTn id="1" dur="indefinite" restart="never" nodeType="tmRoot"/>
+        <p:cTn xmlns:p14="http://schemas.microsoft.com/office/powerpoint/2010/main" id="1" dur="indefinite" restart="never" nodeType="tmRoot"/>
       </p:par>
     </p:tnLst>
   </p:timing>
@@ -3608,7 +3613,7 @@
   <p:timing>
     <p:tnLst>
       <p:par>
-        <p:cTn id="1" dur="indefinite" restart="never" nodeType="tmRoot"/>
+        <p:cTn xmlns:p14="http://schemas.microsoft.com/office/powerpoint/2010/main" id="1" dur="indefinite" restart="never" nodeType="tmRoot"/>
       </p:par>
     </p:tnLst>
   </p:timing>
@@ -3690,11 +3695,7 @@
           <a:p>
             <a:r>
               <a:rPr lang="en-US" dirty="0" smtClean="0"/>
-              <a:t>Tuning and </a:t>
-            </a:r>
-            <a:r>
-              <a:rPr lang="en-US" dirty="0" smtClean="0"/>
-              <a:t>Optimization</a:t>
+              <a:t>Tuning and Optimization</a:t>
             </a:r>
           </a:p>
           <a:p>
@@ -3719,7 +3720,7 @@
   <p:timing>
     <p:tnLst>
       <p:par>
-        <p:cTn id="1" dur="indefinite" restart="never" nodeType="tmRoot"/>
+        <p:cTn xmlns:p14="http://schemas.microsoft.com/office/powerpoint/2010/main" id="1" dur="indefinite" restart="never" nodeType="tmRoot"/>
       </p:par>
     </p:tnLst>
   </p:timing>
@@ -3799,11 +3800,7 @@
           <a:p>
             <a:r>
               <a:rPr lang="en-US" dirty="0" smtClean="0"/>
-              <a:t>Final </a:t>
-            </a:r>
-            <a:r>
-              <a:rPr lang="en-US" dirty="0" smtClean="0"/>
-              <a:t>Kaggle Score</a:t>
+              <a:t>Final Kaggle Score</a:t>
             </a:r>
             <a:endParaRPr lang="en-US" dirty="0"/>
           </a:p>
@@ -3822,7 +3819,7 @@
   <p:timing>
     <p:tnLst>
       <p:par>
-        <p:cTn id="1" dur="indefinite" restart="never" nodeType="tmRoot"/>
+        <p:cTn xmlns:p14="http://schemas.microsoft.com/office/powerpoint/2010/main" id="1" dur="indefinite" restart="never" nodeType="tmRoot"/>
       </p:par>
     </p:tnLst>
   </p:timing>
@@ -3915,7 +3912,7 @@
   <p:timing>
     <p:tnLst>
       <p:par>
-        <p:cTn id="1" dur="indefinite" restart="never" nodeType="tmRoot"/>
+        <p:cTn xmlns:p14="http://schemas.microsoft.com/office/powerpoint/2010/main" id="1" dur="indefinite" restart="never" nodeType="tmRoot"/>
       </p:par>
     </p:tnLst>
   </p:timing>
@@ -4008,7 +4005,7 @@
   <p:timing>
     <p:tnLst>
       <p:par>
-        <p:cTn id="1" dur="indefinite" restart="never" nodeType="tmRoot"/>
+        <p:cTn xmlns:p14="http://schemas.microsoft.com/office/powerpoint/2010/main" id="1" dur="indefinite" restart="never" nodeType="tmRoot"/>
       </p:par>
     </p:tnLst>
   </p:timing>
@@ -4058,7 +4055,7 @@
     </a:clrScheme>
     <a:fontScheme name="Office">
       <a:majorFont>
-        <a:latin typeface="Calibri Light" panose="020F0302020204030204"/>
+        <a:latin typeface="Calibri Light"/>
         <a:ea typeface=""/>
         <a:cs typeface=""/>
         <a:font script="Jpan" typeface="ＭＳ Ｐゴシック"/>
@@ -4093,7 +4090,7 @@
         <a:font script="Geor" typeface="Sylfaen"/>
       </a:majorFont>
       <a:minorFont>
-        <a:latin typeface="Calibri" panose="020F0502020204030204"/>
+        <a:latin typeface="Calibri"/>
         <a:ea typeface=""/>
         <a:cs typeface=""/>
         <a:font script="Jpan" typeface="ＭＳ Ｐゴシック"/>
@@ -4270,7 +4267,7 @@
   <a:extraClrSchemeLst/>
   <a:extLst>
     <a:ext uri="{05A4C25C-085E-4340-85A3-A5531E510DB2}">
-      <thm15:themeFamily xmlns:thm15="http://schemas.microsoft.com/office/thememl/2012/main" name="Office Theme" id="{62F939B6-93AF-4DB8-9C6B-D6C7DFDC589F}" vid="{4A3C46E8-61CC-4603-A589-7422A47A8E4A}"/>
+      <thm15:themeFamily xmlns:thm15="http://schemas.microsoft.com/office/thememl/2012/main" xmlns="" name="Office Theme" id="{62F939B6-93AF-4DB8-9C6B-D6C7DFDC589F}" vid="{4A3C46E8-61CC-4603-A589-7422A47A8E4A}"/>
     </a:ext>
   </a:extLst>
 </a:theme>

</xml_diff>